<commit_message>
Bijwerken van de proeven
</commit_message>
<xml_diff>
--- a/Beroepen/Natuurkunde - Intro & beroepen v0.6.pptx
+++ b/Beroepen/Natuurkunde - Intro & beroepen v0.6.pptx
@@ -310,7 +310,7 @@
             <a:fld id="{8638F0FA-503B-447F-A02E-6BF1D880434F}" type="datetimeFigureOut">
               <a:rPr lang="nl-NL" smtClean="0"/>
               <a:pPr/>
-              <a:t>23-1-2022</a:t>
+              <a:t>24-1-2022</a:t>
             </a:fld>
             <a:endParaRPr lang="nl-NL"/>
           </a:p>
@@ -475,7 +475,7 @@
             <a:fld id="{8638F0FA-503B-447F-A02E-6BF1D880434F}" type="datetimeFigureOut">
               <a:rPr lang="nl-NL" smtClean="0"/>
               <a:pPr/>
-              <a:t>23-1-2022</a:t>
+              <a:t>24-1-2022</a:t>
             </a:fld>
             <a:endParaRPr lang="nl-NL"/>
           </a:p>
@@ -650,7 +650,7 @@
             <a:fld id="{8638F0FA-503B-447F-A02E-6BF1D880434F}" type="datetimeFigureOut">
               <a:rPr lang="nl-NL" smtClean="0"/>
               <a:pPr/>
-              <a:t>23-1-2022</a:t>
+              <a:t>24-1-2022</a:t>
             </a:fld>
             <a:endParaRPr lang="nl-NL"/>
           </a:p>
@@ -815,7 +815,7 @@
             <a:fld id="{8638F0FA-503B-447F-A02E-6BF1D880434F}" type="datetimeFigureOut">
               <a:rPr lang="nl-NL" smtClean="0"/>
               <a:pPr/>
-              <a:t>23-1-2022</a:t>
+              <a:t>24-1-2022</a:t>
             </a:fld>
             <a:endParaRPr lang="nl-NL"/>
           </a:p>
@@ -1057,7 +1057,7 @@
             <a:fld id="{8638F0FA-503B-447F-A02E-6BF1D880434F}" type="datetimeFigureOut">
               <a:rPr lang="nl-NL" smtClean="0"/>
               <a:pPr/>
-              <a:t>23-1-2022</a:t>
+              <a:t>24-1-2022</a:t>
             </a:fld>
             <a:endParaRPr lang="nl-NL"/>
           </a:p>
@@ -1339,7 +1339,7 @@
             <a:fld id="{8638F0FA-503B-447F-A02E-6BF1D880434F}" type="datetimeFigureOut">
               <a:rPr lang="nl-NL" smtClean="0"/>
               <a:pPr/>
-              <a:t>23-1-2022</a:t>
+              <a:t>24-1-2022</a:t>
             </a:fld>
             <a:endParaRPr lang="nl-NL"/>
           </a:p>
@@ -1755,7 +1755,7 @@
             <a:fld id="{8638F0FA-503B-447F-A02E-6BF1D880434F}" type="datetimeFigureOut">
               <a:rPr lang="nl-NL" smtClean="0"/>
               <a:pPr/>
-              <a:t>23-1-2022</a:t>
+              <a:t>24-1-2022</a:t>
             </a:fld>
             <a:endParaRPr lang="nl-NL"/>
           </a:p>
@@ -1869,7 +1869,7 @@
             <a:fld id="{8638F0FA-503B-447F-A02E-6BF1D880434F}" type="datetimeFigureOut">
               <a:rPr lang="nl-NL" smtClean="0"/>
               <a:pPr/>
-              <a:t>23-1-2022</a:t>
+              <a:t>24-1-2022</a:t>
             </a:fld>
             <a:endParaRPr lang="nl-NL"/>
           </a:p>
@@ -1961,7 +1961,7 @@
             <a:fld id="{8638F0FA-503B-447F-A02E-6BF1D880434F}" type="datetimeFigureOut">
               <a:rPr lang="nl-NL" smtClean="0"/>
               <a:pPr/>
-              <a:t>23-1-2022</a:t>
+              <a:t>24-1-2022</a:t>
             </a:fld>
             <a:endParaRPr lang="nl-NL"/>
           </a:p>
@@ -2233,7 +2233,7 @@
             <a:fld id="{8638F0FA-503B-447F-A02E-6BF1D880434F}" type="datetimeFigureOut">
               <a:rPr lang="nl-NL" smtClean="0"/>
               <a:pPr/>
-              <a:t>23-1-2022</a:t>
+              <a:t>24-1-2022</a:t>
             </a:fld>
             <a:endParaRPr lang="nl-NL"/>
           </a:p>
@@ -2482,7 +2482,7 @@
             <a:fld id="{8638F0FA-503B-447F-A02E-6BF1D880434F}" type="datetimeFigureOut">
               <a:rPr lang="nl-NL" smtClean="0"/>
               <a:pPr/>
-              <a:t>23-1-2022</a:t>
+              <a:t>24-1-2022</a:t>
             </a:fld>
             <a:endParaRPr lang="nl-NL"/>
           </a:p>
@@ -2690,7 +2690,7 @@
             <a:fld id="{8638F0FA-503B-447F-A02E-6BF1D880434F}" type="datetimeFigureOut">
               <a:rPr lang="nl-NL" smtClean="0"/>
               <a:pPr/>
-              <a:t>23-1-2022</a:t>
+              <a:t>24-1-2022</a:t>
             </a:fld>
             <a:endParaRPr lang="nl-NL"/>
           </a:p>
@@ -6075,6 +6075,91 @@
           <a:chExt cx="0" cy="0"/>
         </a:xfrm>
       </p:grpSpPr>
+      <p:sp>
+        <p:nvSpPr>
+          <p:cNvPr id="2" name="Title 1">
+            <a:extLst>
+              <a:ext uri="{FF2B5EF4-FFF2-40B4-BE49-F238E27FC236}">
+                <a16:creationId xmlns:a16="http://schemas.microsoft.com/office/drawing/2014/main" id="{954F873A-AFEE-4C9A-B51A-873168E5E40D}"/>
+              </a:ext>
+            </a:extLst>
+          </p:cNvPr>
+          <p:cNvSpPr>
+            <a:spLocks noGrp="1"/>
+          </p:cNvSpPr>
+          <p:nvPr>
+            <p:ph type="title"/>
+          </p:nvPr>
+        </p:nvSpPr>
+        <p:spPr/>
+        <p:txBody>
+          <a:bodyPr/>
+          <a:lstStyle/>
+          <a:p>
+            <a:r>
+              <a:rPr lang="nl-NL" dirty="0"/>
+              <a:t>En nu …</a:t>
+            </a:r>
+          </a:p>
+        </p:txBody>
+      </p:sp>
+      <p:sp>
+        <p:nvSpPr>
+          <p:cNvPr id="3" name="Content Placeholder 2">
+            <a:extLst>
+              <a:ext uri="{FF2B5EF4-FFF2-40B4-BE49-F238E27FC236}">
+                <a16:creationId xmlns:a16="http://schemas.microsoft.com/office/drawing/2014/main" id="{AD07E135-6C37-42FF-BB67-616737F0A2F6}"/>
+              </a:ext>
+            </a:extLst>
+          </p:cNvPr>
+          <p:cNvSpPr>
+            <a:spLocks noGrp="1"/>
+          </p:cNvSpPr>
+          <p:nvPr>
+            <p:ph idx="1"/>
+          </p:nvPr>
+        </p:nvSpPr>
+        <p:spPr/>
+        <p:txBody>
+          <a:bodyPr>
+            <a:normAutofit fontScale="92500" lnSpcReduction="20000"/>
+          </a:bodyPr>
+          <a:lstStyle/>
+          <a:p>
+            <a:r>
+              <a:rPr lang="nl-NL" dirty="0"/>
+              <a:t>Verbazen</a:t>
+            </a:r>
+          </a:p>
+          <a:p>
+            <a:r>
+              <a:rPr lang="nl-NL" dirty="0"/>
+              <a:t>Vragen stellen</a:t>
+            </a:r>
+          </a:p>
+          <a:p>
+            <a:r>
+              <a:rPr lang="nl-NL" dirty="0"/>
+              <a:t>Onderzoek doen (proefjes uitvoeren)</a:t>
+            </a:r>
+          </a:p>
+          <a:p>
+            <a:endParaRPr lang="nl-NL" dirty="0"/>
+          </a:p>
+          <a:p>
+            <a:r>
+              <a:rPr lang="nl-NL" dirty="0"/>
+              <a:t>Jullie trekken langs 6 proeven van 20 minuten elk</a:t>
+            </a:r>
+          </a:p>
+          <a:p>
+            <a:r>
+              <a:rPr lang="nl-NL" dirty="0"/>
+              <a:t>We komen daarna hier om 14 uur terug voor de afsluiting</a:t>
+            </a:r>
+          </a:p>
+        </p:txBody>
+      </p:sp>
     </p:spTree>
   </p:cSld>
   <p:clrMapOvr>

</xml_diff>